<commit_message>
#Informe de Avance - Actualizaciones
</commit_message>
<xml_diff>
--- a/docs/Reuniones/Sprint 3/Informe de Avance/Informe de Avance.pptx
+++ b/docs/Reuniones/Sprint 3/Informe de Avance/Informe de Avance.pptx
@@ -111,6 +111,11 @@
       </a:defRPr>
     </a:lvl9pPr>
   </p:defaultTextStyle>
+  <p:extLst>
+    <p:ext uri="{EFAFB233-063F-42B5-8137-9DF3F51BA10A}">
+      <p15:sldGuideLst xmlns:p15="http://schemas.microsoft.com/office/powerpoint/2012/main"/>
+    </p:ext>
+  </p:extLst>
 </p:presentation>
 </file>
 
@@ -4584,7 +4589,7 @@
       </p:sp>
       <p:pic>
         <p:nvPicPr>
-          <p:cNvPr id="5" name="Content Placeholder 4"/>
+          <p:cNvPr id="4" name="Content Placeholder 3"/>
           <p:cNvPicPr>
             <a:picLocks noGrp="1" noChangeAspect="1"/>
           </p:cNvPicPr>
@@ -4606,8 +4611,8 @@
         </p:blipFill>
         <p:spPr>
           <a:xfrm>
-            <a:off x="2390264" y="2189718"/>
-            <a:ext cx="7325747" cy="3410426"/>
+            <a:off x="1930400" y="1587557"/>
+            <a:ext cx="8006017" cy="4480734"/>
           </a:xfrm>
         </p:spPr>
       </p:pic>

</xml_diff>

<commit_message>
# Modified Charts & Pictures Informe de Avance.pptx
</commit_message>
<xml_diff>
--- a/docs/Reuniones/Sprint 3/Informe de Avance/Informe de Avance.pptx
+++ b/docs/Reuniones/Sprint 3/Informe de Avance/Informe de Avance.pptx
@@ -13,6 +13,7 @@
     <p:sldId id="264" r:id="rId7"/>
     <p:sldId id="265" r:id="rId8"/>
     <p:sldId id="266" r:id="rId9"/>
+    <p:sldId id="267" r:id="rId10"/>
   </p:sldIdLst>
   <p:sldSz cx="12192000" cy="6858000"/>
   <p:notesSz cx="6858000" cy="9144000"/>
@@ -4010,7 +4011,7 @@
       </p:sp>
       <p:pic>
         <p:nvPicPr>
-          <p:cNvPr id="4" name="Picture 3"/>
+          <p:cNvPr id="3" name="Picture 2"/>
           <p:cNvPicPr>
             <a:picLocks noChangeAspect="1"/>
           </p:cNvPicPr>
@@ -4030,8 +4031,8 @@
         </p:blipFill>
         <p:spPr>
           <a:xfrm>
-            <a:off x="217450" y="1803499"/>
-            <a:ext cx="11710419" cy="4237082"/>
+            <a:off x="239338" y="1554118"/>
+            <a:ext cx="11656116" cy="4200861"/>
           </a:xfrm>
           <a:prstGeom prst="rect">
             <a:avLst/>
@@ -4244,7 +4245,11 @@
             </a:r>
             <a:r>
               <a:rPr lang="es-AR" sz="3200" dirty="0" smtClean="0"/>
-              <a:t> 35 </a:t>
+              <a:t> </a:t>
+            </a:r>
+            <a:r>
+              <a:rPr lang="es-AR" sz="3200" dirty="0" smtClean="0"/>
+              <a:t>38 </a:t>
             </a:r>
             <a:r>
               <a:rPr lang="es-AR" sz="3200" dirty="0" err="1" smtClean="0"/>
@@ -4620,6 +4625,111 @@
     <p:extLst>
       <p:ext uri="{BB962C8B-B14F-4D97-AF65-F5344CB8AC3E}">
         <p14:creationId xmlns:p14="http://schemas.microsoft.com/office/powerpoint/2010/main" val="461740777"/>
+      </p:ext>
+    </p:extLst>
+  </p:cSld>
+  <p:clrMapOvr>
+    <a:masterClrMapping/>
+  </p:clrMapOvr>
+  <p:timing>
+    <p:tnLst>
+      <p:par>
+        <p:cTn id="1" dur="indefinite" restart="never" nodeType="tmRoot"/>
+      </p:par>
+    </p:tnLst>
+  </p:timing>
+</p:sld>
+</file>
+
+<file path=ppt/slides/slide9.xml><?xml version="1.0" encoding="utf-8"?>
+<p:sld xmlns:a="http://schemas.openxmlformats.org/drawingml/2006/main" xmlns:r="http://schemas.openxmlformats.org/officeDocument/2006/relationships" xmlns:p="http://schemas.openxmlformats.org/presentationml/2006/main">
+  <p:cSld>
+    <p:spTree>
+      <p:nvGrpSpPr>
+        <p:cNvPr id="1" name=""/>
+        <p:cNvGrpSpPr/>
+        <p:nvPr/>
+      </p:nvGrpSpPr>
+      <p:grpSpPr>
+        <a:xfrm>
+          <a:off x="0" y="0"/>
+          <a:ext cx="0" cy="0"/>
+          <a:chOff x="0" y="0"/>
+          <a:chExt cx="0" cy="0"/>
+        </a:xfrm>
+      </p:grpSpPr>
+      <p:sp>
+        <p:nvSpPr>
+          <p:cNvPr id="2" name="1 Título"/>
+          <p:cNvSpPr>
+            <a:spLocks noGrp="1"/>
+          </p:cNvSpPr>
+          <p:nvPr>
+            <p:ph type="title"/>
+          </p:nvPr>
+        </p:nvSpPr>
+        <p:spPr>
+          <a:xfrm>
+            <a:off x="2024034" y="142852"/>
+            <a:ext cx="8229600" cy="1344203"/>
+          </a:xfrm>
+        </p:spPr>
+        <p:txBody>
+          <a:bodyPr>
+            <a:normAutofit/>
+          </a:bodyPr>
+          <a:lstStyle/>
+          <a:p>
+            <a:pPr algn="ctr"/>
+            <a:r>
+              <a:rPr lang="en-US" dirty="0" err="1" smtClean="0"/>
+              <a:t>Editar</a:t>
+            </a:r>
+            <a:r>
+              <a:rPr lang="en-US" dirty="0" smtClean="0"/>
+              <a:t> </a:t>
+            </a:r>
+            <a:r>
+              <a:rPr lang="en-US" dirty="0" err="1" smtClean="0"/>
+              <a:t>Sala</a:t>
+            </a:r>
+            <a:endParaRPr lang="es-AR" sz="3600" i="1" dirty="0"/>
+          </a:p>
+        </p:txBody>
+      </p:sp>
+      <p:pic>
+        <p:nvPicPr>
+          <p:cNvPr id="5" name="Content Placeholder 4"/>
+          <p:cNvPicPr>
+            <a:picLocks noGrp="1" noChangeAspect="1"/>
+          </p:cNvPicPr>
+          <p:nvPr>
+            <p:ph idx="1"/>
+          </p:nvPr>
+        </p:nvPicPr>
+        <p:blipFill>
+          <a:blip r:embed="rId2">
+            <a:extLst>
+              <a:ext uri="{28A0092B-C50C-407E-A947-70E740481C1C}">
+                <a14:useLocalDpi xmlns:a14="http://schemas.microsoft.com/office/drawing/2010/main" val="0"/>
+              </a:ext>
+            </a:extLst>
+          </a:blip>
+          <a:stretch>
+            <a:fillRect/>
+          </a:stretch>
+        </p:blipFill>
+        <p:spPr>
+          <a:xfrm>
+            <a:off x="1847908" y="1398278"/>
+            <a:ext cx="8581852" cy="4817883"/>
+          </a:xfrm>
+        </p:spPr>
+      </p:pic>
+    </p:spTree>
+    <p:extLst>
+      <p:ext uri="{BB962C8B-B14F-4D97-AF65-F5344CB8AC3E}">
+        <p14:creationId xmlns:p14="http://schemas.microsoft.com/office/powerpoint/2010/main" val="258802038"/>
       </p:ext>
     </p:extLst>
   </p:cSld>

</xml_diff>